<commit_message>
Updated for Fabric Conference Europe
</commit_message>
<xml_diff>
--- a/Microsoft Fabric/Tips and Tricks for Microsoft Fabric Data Warehouse/20240727 - SQL Saturday Baton Rouge - Tips and Tricks for Microsoft Fabric Data Warehouse.pptx
+++ b/Microsoft Fabric/Tips and Tricks for Microsoft Fabric Data Warehouse/20240727 - SQL Saturday Baton Rouge - Tips and Tricks for Microsoft Fabric Data Warehouse.pptx
@@ -232,7 +232,7 @@
           <a:p>
             <a:fld id="{A67D5ABB-D6C8-4484-9BD7-0B2C71080924}" type="datetimeFigureOut">
               <a:rPr lang="en-US" smtClean="0"/>
-              <a:t>7/27/2024</a:t>
+              <a:t>9/25/2024</a:t>
             </a:fld>
             <a:endParaRPr lang="en-US"/>
           </a:p>
@@ -1799,7 +1799,7 @@
             <a:fld id="{B61BEF0D-F0BB-DE4B-95CE-6DB70DBA9567}" type="datetimeFigureOut">
               <a:rPr lang="en-US" dirty="0"/>
               <a:pPr/>
-              <a:t>7/27/2024</a:t>
+              <a:t>9/25/2024</a:t>
             </a:fld>
             <a:endParaRPr lang="en-US" dirty="0"/>
           </a:p>
@@ -2047,7 +2047,7 @@
             <a:fld id="{B61BEF0D-F0BB-DE4B-95CE-6DB70DBA9567}" type="datetimeFigureOut">
               <a:rPr lang="en-US" dirty="0"/>
               <a:pPr/>
-              <a:t>7/27/2024</a:t>
+              <a:t>9/25/2024</a:t>
             </a:fld>
             <a:endParaRPr lang="en-US" dirty="0"/>
           </a:p>
@@ -2358,7 +2358,7 @@
             <a:fld id="{B61BEF0D-F0BB-DE4B-95CE-6DB70DBA9567}" type="datetimeFigureOut">
               <a:rPr lang="en-US" dirty="0"/>
               <a:pPr/>
-              <a:t>7/27/2024</a:t>
+              <a:t>9/25/2024</a:t>
             </a:fld>
             <a:endParaRPr lang="en-US" dirty="0"/>
           </a:p>
@@ -2688,7 +2688,7 @@
             <a:fld id="{B61BEF0D-F0BB-DE4B-95CE-6DB70DBA9567}" type="datetimeFigureOut">
               <a:rPr lang="en-US" dirty="0"/>
               <a:pPr/>
-              <a:t>7/27/2024</a:t>
+              <a:t>9/25/2024</a:t>
             </a:fld>
             <a:endParaRPr lang="en-US" dirty="0"/>
           </a:p>
@@ -2999,7 +2999,7 @@
             <a:fld id="{B61BEF0D-F0BB-DE4B-95CE-6DB70DBA9567}" type="datetimeFigureOut">
               <a:rPr lang="en-US" dirty="0"/>
               <a:pPr/>
-              <a:t>7/27/2024</a:t>
+              <a:t>9/25/2024</a:t>
             </a:fld>
             <a:endParaRPr lang="en-US" dirty="0"/>
           </a:p>
@@ -3389,7 +3389,7 @@
             <a:fld id="{B61BEF0D-F0BB-DE4B-95CE-6DB70DBA9567}" type="datetimeFigureOut">
               <a:rPr lang="en-US" dirty="0"/>
               <a:pPr/>
-              <a:t>7/27/2024</a:t>
+              <a:t>9/25/2024</a:t>
             </a:fld>
             <a:endParaRPr lang="en-US" dirty="0"/>
           </a:p>
@@ -3555,7 +3555,7 @@
           <a:p>
             <a:fld id="{55C6B4A9-1611-4792-9094-5F34BCA07E0B}" type="datetimeFigureOut">
               <a:rPr lang="en-US" dirty="0"/>
-              <a:t>7/27/2024</a:t>
+              <a:t>9/25/2024</a:t>
             </a:fld>
             <a:endParaRPr lang="en-US" dirty="0"/>
           </a:p>
@@ -3731,7 +3731,7 @@
             <a:fld id="{B61BEF0D-F0BB-DE4B-95CE-6DB70DBA9567}" type="datetimeFigureOut">
               <a:rPr lang="en-US" dirty="0"/>
               <a:pPr/>
-              <a:t>7/27/2024</a:t>
+              <a:t>9/25/2024</a:t>
             </a:fld>
             <a:endParaRPr lang="en-US" dirty="0"/>
           </a:p>
@@ -3897,7 +3897,7 @@
           <a:p>
             <a:fld id="{42A54C80-263E-416B-A8E0-580EDEADCBDC}" type="datetimeFigureOut">
               <a:rPr lang="en-US" dirty="0"/>
-              <a:t>7/27/2024</a:t>
+              <a:t>9/25/2024</a:t>
             </a:fld>
             <a:endParaRPr lang="en-US" dirty="0"/>
           </a:p>
@@ -4140,7 +4140,7 @@
             <a:fld id="{B61BEF0D-F0BB-DE4B-95CE-6DB70DBA9567}" type="datetimeFigureOut">
               <a:rPr lang="en-US" dirty="0"/>
               <a:pPr/>
-              <a:t>7/27/2024</a:t>
+              <a:t>9/25/2024</a:t>
             </a:fld>
             <a:endParaRPr lang="en-US" dirty="0"/>
           </a:p>
@@ -4368,7 +4368,7 @@
           <a:p>
             <a:fld id="{42A54C80-263E-416B-A8E0-580EDEADCBDC}" type="datetimeFigureOut">
               <a:rPr lang="en-US" dirty="0"/>
-              <a:t>7/27/2024</a:t>
+              <a:t>9/25/2024</a:t>
             </a:fld>
             <a:endParaRPr lang="en-US" dirty="0"/>
           </a:p>
@@ -4738,7 +4738,7 @@
             <a:fld id="{B61BEF0D-F0BB-DE4B-95CE-6DB70DBA9567}" type="datetimeFigureOut">
               <a:rPr lang="en-US" dirty="0"/>
               <a:pPr/>
-              <a:t>7/27/2024</a:t>
+              <a:t>9/25/2024</a:t>
             </a:fld>
             <a:endParaRPr lang="en-US" dirty="0"/>
           </a:p>
@@ -4858,7 +4858,7 @@
             <a:fld id="{B61BEF0D-F0BB-DE4B-95CE-6DB70DBA9567}" type="datetimeFigureOut">
               <a:rPr lang="en-US" dirty="0"/>
               <a:pPr/>
-              <a:t>7/27/2024</a:t>
+              <a:t>9/25/2024</a:t>
             </a:fld>
             <a:endParaRPr lang="en-US" dirty="0"/>
           </a:p>
@@ -4950,7 +4950,7 @@
             <a:fld id="{B61BEF0D-F0BB-DE4B-95CE-6DB70DBA9567}" type="datetimeFigureOut">
               <a:rPr lang="en-US" dirty="0"/>
               <a:pPr/>
-              <a:t>7/27/2024</a:t>
+              <a:t>9/25/2024</a:t>
             </a:fld>
             <a:endParaRPr lang="en-US" dirty="0"/>
           </a:p>
@@ -5201,7 +5201,7 @@
           <a:p>
             <a:fld id="{42A54C80-263E-416B-A8E0-580EDEADCBDC}" type="datetimeFigureOut">
               <a:rPr lang="en-US" dirty="0"/>
-              <a:t>7/27/2024</a:t>
+              <a:t>9/25/2024</a:t>
             </a:fld>
             <a:endParaRPr lang="en-US" dirty="0"/>
           </a:p>
@@ -5503,7 +5503,7 @@
             <a:fld id="{B61BEF0D-F0BB-DE4B-95CE-6DB70DBA9567}" type="datetimeFigureOut">
               <a:rPr lang="en-US" dirty="0"/>
               <a:pPr/>
-              <a:t>7/27/2024</a:t>
+              <a:t>9/25/2024</a:t>
             </a:fld>
             <a:endParaRPr lang="en-US" dirty="0"/>
           </a:p>
@@ -6201,7 +6201,7 @@
             <a:fld id="{B61BEF0D-F0BB-DE4B-95CE-6DB70DBA9567}" type="datetimeFigureOut">
               <a:rPr lang="en-US" dirty="0"/>
               <a:pPr/>
-              <a:t>7/27/2024</a:t>
+              <a:t>9/25/2024</a:t>
             </a:fld>
             <a:endParaRPr lang="en-US" dirty="0"/>
           </a:p>

</xml_diff>